<commit_message>
Added final deliverables & zip
</commit_message>
<xml_diff>
--- a/deliverables/763 Final Project Presentation.pptx
+++ b/deliverables/763 Final Project Presentation.pptx
@@ -12259,23 +12259,6 @@
             </a:r>
             <a:endParaRPr sz="2400"/>
           </a:p>
-          <a:p>
-            <a:pPr indent="-381000" lvl="0" marL="457200" rtl="0" algn="l">
-              <a:spcBef>
-                <a:spcPts val="0"/>
-              </a:spcBef>
-              <a:spcAft>
-                <a:spcPts val="0"/>
-              </a:spcAft>
-              <a:buSzPts val="2400"/>
-              <a:buChar char="●"/>
-            </a:pPr>
-            <a:r>
-              <a:rPr lang="en" sz="2400"/>
-              <a:t>Choosing the right problem to solve is important</a:t>
-            </a:r>
-            <a:endParaRPr sz="2400"/>
-          </a:p>
         </p:txBody>
       </p:sp>
       <p:pic>
@@ -12472,6 +12455,23 @@
             </a:pPr>
             <a:r>
               <a:rPr lang="en" sz="2400"/>
+              <a:t>Choosing the right problem to solve is important</a:t>
+            </a:r>
+            <a:endParaRPr sz="2400"/>
+          </a:p>
+          <a:p>
+            <a:pPr indent="-381000" lvl="0" marL="457200" rtl="0" algn="l">
+              <a:spcBef>
+                <a:spcPts val="0"/>
+              </a:spcBef>
+              <a:spcAft>
+                <a:spcPts val="0"/>
+              </a:spcAft>
+              <a:buSzPts val="2400"/>
+              <a:buChar char="●"/>
+            </a:pPr>
+            <a:r>
+              <a:rPr lang="en" sz="2400"/>
               <a:t>There’s a lot out there yet to learn in ML (no surprise)</a:t>
             </a:r>
             <a:endParaRPr sz="2400"/>
@@ -13486,7 +13486,7 @@
             </a:pPr>
             <a:r>
               <a:rPr lang="en" sz="2000"/>
-              <a:t>Introduction</a:t>
+              <a:t>Introductions</a:t>
             </a:r>
             <a:endParaRPr sz="2000"/>
           </a:p>

</xml_diff>

<commit_message>
Added final deliverables & zip (#19)
</commit_message>
<xml_diff>
--- a/deliverables/763 Final Project Presentation.pptx
+++ b/deliverables/763 Final Project Presentation.pptx
@@ -12259,23 +12259,6 @@
             </a:r>
             <a:endParaRPr sz="2400"/>
           </a:p>
-          <a:p>
-            <a:pPr indent="-381000" lvl="0" marL="457200" rtl="0" algn="l">
-              <a:spcBef>
-                <a:spcPts val="0"/>
-              </a:spcBef>
-              <a:spcAft>
-                <a:spcPts val="0"/>
-              </a:spcAft>
-              <a:buSzPts val="2400"/>
-              <a:buChar char="●"/>
-            </a:pPr>
-            <a:r>
-              <a:rPr lang="en" sz="2400"/>
-              <a:t>Choosing the right problem to solve is important</a:t>
-            </a:r>
-            <a:endParaRPr sz="2400"/>
-          </a:p>
         </p:txBody>
       </p:sp>
       <p:pic>
@@ -12472,6 +12455,23 @@
             </a:pPr>
             <a:r>
               <a:rPr lang="en" sz="2400"/>
+              <a:t>Choosing the right problem to solve is important</a:t>
+            </a:r>
+            <a:endParaRPr sz="2400"/>
+          </a:p>
+          <a:p>
+            <a:pPr indent="-381000" lvl="0" marL="457200" rtl="0" algn="l">
+              <a:spcBef>
+                <a:spcPts val="0"/>
+              </a:spcBef>
+              <a:spcAft>
+                <a:spcPts val="0"/>
+              </a:spcAft>
+              <a:buSzPts val="2400"/>
+              <a:buChar char="●"/>
+            </a:pPr>
+            <a:r>
+              <a:rPr lang="en" sz="2400"/>
               <a:t>There’s a lot out there yet to learn in ML (no surprise)</a:t>
             </a:r>
             <a:endParaRPr sz="2400"/>
@@ -13486,7 +13486,7 @@
             </a:pPr>
             <a:r>
               <a:rPr lang="en" sz="2000"/>
-              <a:t>Introduction</a:t>
+              <a:t>Introductions</a:t>
             </a:r>
             <a:endParaRPr sz="2000"/>
           </a:p>

</xml_diff>